<commit_message>
adding GDP log transform tweak
</commit_message>
<xml_diff>
--- a/presentation/Team-25_Model.pptx
+++ b/presentation/Team-25_Model.pptx
@@ -4126,10 +4126,10 @@
       </p:sp>
       <p:pic>
         <p:nvPicPr>
-          <p:cNvPr id="6" name="Picture 5">
-            <a:extLst>
-              <a:ext uri="{FF2B5EF4-FFF2-40B4-BE49-F238E27FC236}">
-                <a16:creationId xmlns:a16="http://schemas.microsoft.com/office/drawing/2014/main" id="{CB48AB7C-CFFA-2C48-ADFC-E3E8E991545B}"/>
+          <p:cNvPr id="4" name="Picture 3">
+            <a:extLst>
+              <a:ext uri="{FF2B5EF4-FFF2-40B4-BE49-F238E27FC236}">
+                <a16:creationId xmlns:a16="http://schemas.microsoft.com/office/drawing/2014/main" id="{6FB57E4A-A058-5245-B352-86278EDAC6BB}"/>
               </a:ext>
             </a:extLst>
           </p:cNvPr>
@@ -4146,8 +4146,8 @@
         </p:blipFill>
         <p:spPr>
           <a:xfrm>
-            <a:off x="852054" y="1068361"/>
-            <a:ext cx="9947617" cy="5497930"/>
+            <a:off x="852054" y="1093799"/>
+            <a:ext cx="10035393" cy="5360926"/>
           </a:xfrm>
           <a:prstGeom prst="rect">
             <a:avLst/>

</xml_diff>